<commit_message>
update image on renv integration
</commit_message>
<xml_diff>
--- a/modules/week07/slides-renv-07.pptx
+++ b/modules/week07/slides-renv-07.pptx
@@ -120,6 +120,11 @@
       </a:defRPr>
     </a:lvl9pPr>
   </p:defaultTextStyle>
+  <p:extLst>
+    <p:ext uri="{EFAFB233-063F-42B5-8137-9DF3F51BA10A}">
+      <p15:sldGuideLst xmlns:p15="http://schemas.microsoft.com/office/powerpoint/2012/main"/>
+    </p:ext>
+  </p:extLst>
 </p:presentation>
 </file>
 
@@ -1229,7 +1234,7 @@
         </p:nvSpPr>
         <p:spPr>
           <a:xfrm>
-            <a:off x="381300" y="685800"/>
+            <a:off x="381000" y="685800"/>
             <a:ext cx="6096000" cy="3429000"/>
           </a:xfrm>
           <a:custGeom>
@@ -8221,24 +8226,16 @@
           <a:chExt cx="0" cy="0"/>
         </a:xfrm>
       </p:grpSpPr>
-      <p:pic>
-        <p:nvPicPr>
-          <p:cNvPr id="444" name="Google Shape;444;p63"/>
-          <p:cNvPicPr preferRelativeResize="0"/>
+      <p:sp>
+        <p:nvSpPr>
+          <p:cNvPr id="445" name="Google Shape;445;p63"/>
+          <p:cNvSpPr txBox="1"/>
           <p:nvPr/>
-        </p:nvPicPr>
-        <p:blipFill>
-          <a:blip r:embed="rId3">
-            <a:alphaModFix/>
-          </a:blip>
-          <a:stretch>
-            <a:fillRect/>
-          </a:stretch>
-        </p:blipFill>
-        <p:spPr>
-          <a:xfrm>
-            <a:off x="749400" y="2462300"/>
-            <a:ext cx="10975200" cy="1433333"/>
+        </p:nvSpPr>
+        <p:spPr>
+          <a:xfrm>
+            <a:off x="528933" y="570367"/>
+            <a:ext cx="10418800" cy="861734"/>
           </a:xfrm>
           <a:prstGeom prst="rect">
             <a:avLst/>
@@ -8248,26 +8245,6 @@
             <a:noFill/>
           </a:ln>
         </p:spPr>
-      </p:pic>
-      <p:sp>
-        <p:nvSpPr>
-          <p:cNvPr id="445" name="Google Shape;445;p63"/>
-          <p:cNvSpPr txBox="1"/>
-          <p:nvPr/>
-        </p:nvSpPr>
-        <p:spPr>
-          <a:xfrm>
-            <a:off x="528933" y="570367"/>
-            <a:ext cx="10418800" cy="861734"/>
-          </a:xfrm>
-          <a:prstGeom prst="rect">
-            <a:avLst/>
-          </a:prstGeom>
-          <a:noFill/>
-          <a:ln>
-            <a:noFill/>
-          </a:ln>
-        </p:spPr>
         <p:txBody>
           <a:bodyPr spcFirstLastPara="1" wrap="square" lIns="121900" tIns="121900" rIns="121900" bIns="121900" anchor="t" anchorCtr="0">
             <a:spAutoFit/>
@@ -8275,7 +8252,7 @@
           <a:lstStyle/>
           <a:p>
             <a:r>
-              <a:rPr lang="en" sz="4000" b="1">
+              <a:rPr lang="en" sz="4000" b="1" dirty="0">
                 <a:solidFill>
                   <a:srgbClr val="004B83"/>
                 </a:solidFill>
@@ -8284,9 +8261,21 @@
                 <a:cs typeface="Century Gothic"/>
                 <a:sym typeface="Century Gothic"/>
               </a:rPr>
-              <a:t>Do you see this cube in Rstudio?</a:t>
-            </a:r>
-            <a:endParaRPr sz="4000" b="1">
+              <a:t>Well integrated with </a:t>
+            </a:r>
+            <a:r>
+              <a:rPr lang="en" sz="4000" b="1" dirty="0" err="1">
+                <a:solidFill>
+                  <a:srgbClr val="004B83"/>
+                </a:solidFill>
+                <a:latin typeface="Century Gothic"/>
+                <a:ea typeface="Century Gothic"/>
+                <a:cs typeface="Century Gothic"/>
+                <a:sym typeface="Century Gothic"/>
+              </a:rPr>
+              <a:t>Rstudio</a:t>
+            </a:r>
+            <a:endParaRPr sz="4000" b="1" dirty="0">
               <a:solidFill>
                 <a:srgbClr val="004B83"/>
               </a:solidFill>
@@ -8306,7 +8295,7 @@
         </p:nvSpPr>
         <p:spPr>
           <a:xfrm>
-            <a:off x="749400" y="4775601"/>
+            <a:off x="749400" y="5691466"/>
             <a:ext cx="10418800" cy="861734"/>
           </a:xfrm>
           <a:prstGeom prst="rect">
@@ -8324,7 +8313,7 @@
           <a:lstStyle/>
           <a:p>
             <a:r>
-              <a:rPr lang="en" sz="4000" b="1">
+              <a:rPr lang="en" sz="4000" b="1" dirty="0">
                 <a:solidFill>
                   <a:srgbClr val="004B83"/>
                 </a:solidFill>
@@ -8335,7 +8324,7 @@
               </a:rPr>
               <a:t>Have you ever used it?</a:t>
             </a:r>
-            <a:endParaRPr sz="4000" b="1">
+            <a:endParaRPr sz="4000" b="1" dirty="0">
               <a:solidFill>
                 <a:srgbClr val="004B83"/>
               </a:solidFill>
@@ -8347,6 +8336,36 @@
           </a:p>
         </p:txBody>
       </p:sp>
+      <p:pic>
+        <p:nvPicPr>
+          <p:cNvPr id="3" name="Picture 2" descr="A screenshot of a project&#10;&#10;Description automatically generated">
+            <a:extLst>
+              <a:ext uri="{FF2B5EF4-FFF2-40B4-BE49-F238E27FC236}">
+                <a16:creationId xmlns:a16="http://schemas.microsoft.com/office/drawing/2014/main" id="{D0DA1D34-90D3-BE3C-9DBF-4EEE31F4E3D5}"/>
+              </a:ext>
+            </a:extLst>
+          </p:cNvPr>
+          <p:cNvPicPr>
+            <a:picLocks noChangeAspect="1"/>
+          </p:cNvPicPr>
+          <p:nvPr/>
+        </p:nvPicPr>
+        <p:blipFill>
+          <a:blip r:embed="rId3"/>
+          <a:stretch>
+            <a:fillRect/>
+          </a:stretch>
+        </p:blipFill>
+        <p:spPr>
+          <a:xfrm>
+            <a:off x="3503484" y="1639951"/>
+            <a:ext cx="5185032" cy="3962400"/>
+          </a:xfrm>
+          <a:prstGeom prst="rect">
+            <a:avLst/>
+          </a:prstGeom>
+        </p:spPr>
+      </p:pic>
     </p:spTree>
   </p:cSld>
   <p:clrMapOvr>

</xml_diff>